<commit_message>
start revision of 04-func
</commit_message>
<xml_diff>
--- a/images/de/images.pptx
+++ b/images/de/images.pptx
@@ -7,6 +7,8 @@
   <p:sldIdLst>
     <p:sldId id="256" r:id="rId2"/>
     <p:sldId id="257" r:id="rId3"/>
+    <p:sldId id="258" r:id="rId4"/>
+    <p:sldId id="259" r:id="rId5"/>
   </p:sldIdLst>
   <p:sldSz cx="12192000" cy="6858000"/>
   <p:notesSz cx="6858000" cy="9144000"/>
@@ -4042,13 +4044,7 @@
               <a:schemeClr val="tx1"/>
             </a:solidFill>
           </a:ln>
-          <a:effectLst>
-            <a:outerShdw blurRad="50800" dist="38100" dir="2700000" algn="tl" rotWithShape="0">
-              <a:prstClr val="black">
-                <a:alpha val="40000"/>
-              </a:prstClr>
-            </a:outerShdw>
-          </a:effectLst>
+          <a:effectLst/>
         </p:spPr>
         <p:style>
           <a:lnRef idx="2">
@@ -4111,6 +4107,7 @@
             </a:solidFill>
             <a:tailEnd type="triangle"/>
           </a:ln>
+          <a:effectLst/>
         </p:spPr>
         <p:style>
           <a:lnRef idx="1">
@@ -4149,13 +4146,7 @@
               <a:schemeClr val="tx1"/>
             </a:solidFill>
           </a:ln>
-          <a:effectLst>
-            <a:outerShdw blurRad="50800" dist="38100" dir="2700000" algn="tl" rotWithShape="0">
-              <a:prstClr val="black">
-                <a:alpha val="40000"/>
-              </a:prstClr>
-            </a:outerShdw>
-          </a:effectLst>
+          <a:effectLst/>
         </p:spPr>
         <p:style>
           <a:lnRef idx="2">
@@ -4231,6 +4222,7 @@
             </a:solidFill>
             <a:tailEnd type="triangle"/>
           </a:ln>
+          <a:effectLst/>
         </p:spPr>
         <p:style>
           <a:lnRef idx="1">
@@ -4267,6 +4259,7 @@
             </a:solidFill>
             <a:tailEnd type="triangle"/>
           </a:ln>
+          <a:effectLst/>
         </p:spPr>
         <p:style>
           <a:lnRef idx="1">
@@ -4305,6 +4298,1433 @@
             </a:solidFill>
             <a:tailEnd type="triangle"/>
           </a:ln>
+          <a:effectLst/>
+        </p:spPr>
+        <p:style>
+          <a:lnRef idx="1">
+            <a:schemeClr val="accent1"/>
+          </a:lnRef>
+          <a:fillRef idx="0">
+            <a:schemeClr val="accent1"/>
+          </a:fillRef>
+          <a:effectRef idx="0">
+            <a:schemeClr val="accent1"/>
+          </a:effectRef>
+          <a:fontRef idx="minor">
+            <a:schemeClr val="tx1"/>
+          </a:fontRef>
+        </p:style>
+      </p:cxnSp>
+      <p:sp>
+        <p:nvSpPr>
+          <p:cNvPr id="8" name="Flussdiagramm: Verzweigung 7"/>
+          <p:cNvSpPr/>
+          <p:nvPr/>
+        </p:nvSpPr>
+        <p:spPr>
+          <a:xfrm>
+            <a:off x="7494982" y="3553931"/>
+            <a:ext cx="1983240" cy="1014157"/>
+          </a:xfrm>
+          <a:prstGeom prst="flowChartDecision">
+            <a:avLst/>
+          </a:prstGeom>
+          <a:solidFill>
+            <a:schemeClr val="bg1"/>
+          </a:solidFill>
+          <a:ln w="28575">
+            <a:solidFill>
+              <a:schemeClr val="tx1"/>
+            </a:solidFill>
+          </a:ln>
+          <a:effectLst/>
+        </p:spPr>
+        <p:style>
+          <a:lnRef idx="2">
+            <a:schemeClr val="accent1">
+              <a:shade val="50000"/>
+            </a:schemeClr>
+          </a:lnRef>
+          <a:fillRef idx="1">
+            <a:schemeClr val="accent1"/>
+          </a:fillRef>
+          <a:effectRef idx="0">
+            <a:schemeClr val="accent1"/>
+          </a:effectRef>
+          <a:fontRef idx="minor">
+            <a:schemeClr val="lt1"/>
+          </a:fontRef>
+        </p:style>
+        <p:txBody>
+          <a:bodyPr lIns="0" rIns="0" rtlCol="0" anchor="ctr"/>
+          <a:lstStyle/>
+          <a:p>
+            <a:pPr algn="ctr"/>
+            <a:r>
+              <a:rPr lang="de-DE" dirty="0" smtClean="0">
+                <a:solidFill>
+                  <a:schemeClr val="tx1"/>
+                </a:solidFill>
+                <a:latin typeface="Dubai" panose="020B0503030403030204" pitchFamily="34" charset="-78"/>
+                <a:cs typeface="Dubai" panose="020B0503030403030204" pitchFamily="34" charset="-78"/>
+              </a:rPr>
+              <a:t>x%2 == </a:t>
+            </a:r>
+            <a:r>
+              <a:rPr lang="de-DE" dirty="0" smtClean="0">
+                <a:solidFill>
+                  <a:schemeClr val="tx1"/>
+                </a:solidFill>
+                <a:latin typeface="Dubai" panose="020B0503030403030204" pitchFamily="34" charset="-78"/>
+                <a:cs typeface="Dubai" panose="020B0503030403030204" pitchFamily="34" charset="-78"/>
+              </a:rPr>
+              <a:t>0</a:t>
+            </a:r>
+            <a:endParaRPr lang="de-DE" dirty="0">
+              <a:solidFill>
+                <a:schemeClr val="tx1"/>
+              </a:solidFill>
+              <a:latin typeface="Dubai" panose="020B0503030403030204" pitchFamily="34" charset="-78"/>
+              <a:cs typeface="Dubai" panose="020B0503030403030204" pitchFamily="34" charset="-78"/>
+            </a:endParaRPr>
+          </a:p>
+        </p:txBody>
+      </p:sp>
+      <p:cxnSp>
+        <p:nvCxnSpPr>
+          <p:cNvPr id="11" name="Gerade Verbindung mit Pfeil 10"/>
+          <p:cNvCxnSpPr/>
+          <p:nvPr/>
+        </p:nvCxnSpPr>
+        <p:spPr>
+          <a:xfrm>
+            <a:off x="8486603" y="3080657"/>
+            <a:ext cx="0" cy="473274"/>
+          </a:xfrm>
+          <a:prstGeom prst="straightConnector1">
+            <a:avLst/>
+          </a:prstGeom>
+          <a:ln w="28575">
+            <a:solidFill>
+              <a:schemeClr val="tx1"/>
+            </a:solidFill>
+            <a:tailEnd type="triangle"/>
+          </a:ln>
+          <a:effectLst/>
+        </p:spPr>
+        <p:style>
+          <a:lnRef idx="1">
+            <a:schemeClr val="accent1"/>
+          </a:lnRef>
+          <a:fillRef idx="0">
+            <a:schemeClr val="accent1"/>
+          </a:fillRef>
+          <a:effectRef idx="0">
+            <a:schemeClr val="accent1"/>
+          </a:effectRef>
+          <a:fontRef idx="minor">
+            <a:schemeClr val="tx1"/>
+          </a:fontRef>
+        </p:style>
+      </p:cxnSp>
+      <p:sp>
+        <p:nvSpPr>
+          <p:cNvPr id="13" name="Rechteck 12"/>
+          <p:cNvSpPr/>
+          <p:nvPr/>
+        </p:nvSpPr>
+        <p:spPr>
+          <a:xfrm>
+            <a:off x="9615322" y="4452586"/>
+            <a:ext cx="2489593" cy="533071"/>
+          </a:xfrm>
+          <a:prstGeom prst="rect">
+            <a:avLst/>
+          </a:prstGeom>
+          <a:solidFill>
+            <a:schemeClr val="bg1"/>
+          </a:solidFill>
+          <a:ln w="28575">
+            <a:solidFill>
+              <a:schemeClr val="tx1"/>
+            </a:solidFill>
+          </a:ln>
+          <a:effectLst/>
+        </p:spPr>
+        <p:style>
+          <a:lnRef idx="2">
+            <a:schemeClr val="accent1">
+              <a:shade val="50000"/>
+            </a:schemeClr>
+          </a:lnRef>
+          <a:fillRef idx="1">
+            <a:schemeClr val="accent1"/>
+          </a:fillRef>
+          <a:effectRef idx="0">
+            <a:schemeClr val="accent1"/>
+          </a:effectRef>
+          <a:fontRef idx="minor">
+            <a:schemeClr val="lt1"/>
+          </a:fontRef>
+        </p:style>
+        <p:txBody>
+          <a:bodyPr rtlCol="0" anchor="ctr"/>
+          <a:lstStyle/>
+          <a:p>
+            <a:pPr algn="ctr"/>
+            <a:r>
+              <a:rPr lang="de-DE" dirty="0" err="1" smtClean="0">
+                <a:solidFill>
+                  <a:schemeClr val="tx1"/>
+                </a:solidFill>
+                <a:latin typeface="Dubai" panose="020B0503030403030204" pitchFamily="34" charset="-78"/>
+                <a:cs typeface="Dubai" panose="020B0503030403030204" pitchFamily="34" charset="-78"/>
+              </a:rPr>
+              <a:t>print</a:t>
+            </a:r>
+            <a:r>
+              <a:rPr lang="de-DE" dirty="0" smtClean="0">
+                <a:solidFill>
+                  <a:schemeClr val="tx1"/>
+                </a:solidFill>
+                <a:latin typeface="Dubai" panose="020B0503030403030204" pitchFamily="34" charset="-78"/>
+                <a:cs typeface="Dubai" panose="020B0503030403030204" pitchFamily="34" charset="-78"/>
+              </a:rPr>
+              <a:t>('x ist </a:t>
+            </a:r>
+            <a:r>
+              <a:rPr lang="de-DE" dirty="0" smtClean="0">
+                <a:solidFill>
+                  <a:schemeClr val="tx1"/>
+                </a:solidFill>
+                <a:latin typeface="Dubai" panose="020B0503030403030204" pitchFamily="34" charset="-78"/>
+                <a:cs typeface="Dubai" panose="020B0503030403030204" pitchFamily="34" charset="-78"/>
+              </a:rPr>
+              <a:t>gerade')</a:t>
+            </a:r>
+            <a:endParaRPr lang="de-DE" dirty="0">
+              <a:solidFill>
+                <a:schemeClr val="tx1"/>
+              </a:solidFill>
+              <a:latin typeface="Dubai" panose="020B0503030403030204" pitchFamily="34" charset="-78"/>
+              <a:cs typeface="Dubai" panose="020B0503030403030204" pitchFamily="34" charset="-78"/>
+            </a:endParaRPr>
+          </a:p>
+        </p:txBody>
+      </p:sp>
+      <p:cxnSp>
+        <p:nvCxnSpPr>
+          <p:cNvPr id="14" name="Gewinkelter Verbinder 13"/>
+          <p:cNvCxnSpPr>
+            <a:stCxn id="8" idx="3"/>
+            <a:endCxn id="13" idx="0"/>
+          </p:cNvCxnSpPr>
+          <p:nvPr/>
+        </p:nvCxnSpPr>
+        <p:spPr>
+          <a:xfrm>
+            <a:off x="9478222" y="4061010"/>
+            <a:ext cx="1381897" cy="391576"/>
+          </a:xfrm>
+          <a:prstGeom prst="bentConnector2">
+            <a:avLst/>
+          </a:prstGeom>
+          <a:ln w="28575">
+            <a:solidFill>
+              <a:schemeClr val="tx1"/>
+            </a:solidFill>
+            <a:tailEnd type="triangle"/>
+          </a:ln>
+          <a:effectLst/>
+        </p:spPr>
+        <p:style>
+          <a:lnRef idx="1">
+            <a:schemeClr val="accent1"/>
+          </a:lnRef>
+          <a:fillRef idx="0">
+            <a:schemeClr val="accent1"/>
+          </a:fillRef>
+          <a:effectRef idx="0">
+            <a:schemeClr val="accent1"/>
+          </a:effectRef>
+          <a:fontRef idx="minor">
+            <a:schemeClr val="tx1"/>
+          </a:fontRef>
+        </p:style>
+      </p:cxnSp>
+      <p:cxnSp>
+        <p:nvCxnSpPr>
+          <p:cNvPr id="15" name="Gerade Verbindung mit Pfeil 14"/>
+          <p:cNvCxnSpPr/>
+          <p:nvPr/>
+        </p:nvCxnSpPr>
+        <p:spPr>
+          <a:xfrm>
+            <a:off x="8486601" y="5665949"/>
+            <a:ext cx="0" cy="299422"/>
+          </a:xfrm>
+          <a:prstGeom prst="straightConnector1">
+            <a:avLst/>
+          </a:prstGeom>
+          <a:ln w="28575">
+            <a:solidFill>
+              <a:schemeClr val="tx1"/>
+            </a:solidFill>
+            <a:tailEnd type="triangle"/>
+          </a:ln>
+          <a:effectLst/>
+        </p:spPr>
+        <p:style>
+          <a:lnRef idx="1">
+            <a:schemeClr val="accent1"/>
+          </a:lnRef>
+          <a:fillRef idx="0">
+            <a:schemeClr val="accent1"/>
+          </a:fillRef>
+          <a:effectRef idx="0">
+            <a:schemeClr val="accent1"/>
+          </a:effectRef>
+          <a:fontRef idx="minor">
+            <a:schemeClr val="tx1"/>
+          </a:fontRef>
+        </p:style>
+      </p:cxnSp>
+      <p:cxnSp>
+        <p:nvCxnSpPr>
+          <p:cNvPr id="16" name="Gewinkelter Verbinder 15"/>
+          <p:cNvCxnSpPr>
+            <a:stCxn id="13" idx="2"/>
+          </p:cNvCxnSpPr>
+          <p:nvPr/>
+        </p:nvCxnSpPr>
+        <p:spPr>
+          <a:xfrm rot="5400000">
+            <a:off x="9332341" y="4139921"/>
+            <a:ext cx="682042" cy="2373515"/>
+          </a:xfrm>
+          <a:prstGeom prst="bentConnector2">
+            <a:avLst/>
+          </a:prstGeom>
+          <a:ln w="28575">
+            <a:solidFill>
+              <a:schemeClr val="tx1"/>
+            </a:solidFill>
+            <a:tailEnd type="triangle"/>
+          </a:ln>
+          <a:effectLst/>
+        </p:spPr>
+        <p:style>
+          <a:lnRef idx="1">
+            <a:schemeClr val="accent1"/>
+          </a:lnRef>
+          <a:fillRef idx="0">
+            <a:schemeClr val="accent1"/>
+          </a:fillRef>
+          <a:effectRef idx="0">
+            <a:schemeClr val="accent1"/>
+          </a:effectRef>
+          <a:fontRef idx="minor">
+            <a:schemeClr val="tx1"/>
+          </a:fontRef>
+        </p:style>
+      </p:cxnSp>
+      <p:sp>
+        <p:nvSpPr>
+          <p:cNvPr id="2" name="Rechteck 1"/>
+          <p:cNvSpPr/>
+          <p:nvPr/>
+        </p:nvSpPr>
+        <p:spPr>
+          <a:xfrm>
+            <a:off x="2264004" y="1047830"/>
+            <a:ext cx="606320" cy="369332"/>
+          </a:xfrm>
+          <a:prstGeom prst="rect">
+            <a:avLst/>
+          </a:prstGeom>
+        </p:spPr>
+        <p:txBody>
+          <a:bodyPr wrap="none">
+            <a:spAutoFit/>
+          </a:bodyPr>
+          <a:lstStyle/>
+          <a:p>
+            <a:r>
+              <a:rPr lang="de-DE" dirty="0" smtClean="0">
+                <a:latin typeface="Dubai" panose="020B0503030403030204" pitchFamily="34" charset="-78"/>
+                <a:cs typeface="Dubai" panose="020B0503030403030204" pitchFamily="34" charset="-78"/>
+              </a:rPr>
+              <a:t>True</a:t>
+            </a:r>
+            <a:endParaRPr lang="de-DE" dirty="0"/>
+          </a:p>
+        </p:txBody>
+      </p:sp>
+      <p:sp>
+        <p:nvSpPr>
+          <p:cNvPr id="18" name="Rechteck 17"/>
+          <p:cNvSpPr/>
+          <p:nvPr/>
+        </p:nvSpPr>
+        <p:spPr>
+          <a:xfrm>
+            <a:off x="9866010" y="3690257"/>
+            <a:ext cx="606320" cy="369332"/>
+          </a:xfrm>
+          <a:prstGeom prst="rect">
+            <a:avLst/>
+          </a:prstGeom>
+        </p:spPr>
+        <p:txBody>
+          <a:bodyPr wrap="none">
+            <a:spAutoFit/>
+          </a:bodyPr>
+          <a:lstStyle/>
+          <a:p>
+            <a:r>
+              <a:rPr lang="de-DE" dirty="0" smtClean="0">
+                <a:latin typeface="Dubai" panose="020B0503030403030204" pitchFamily="34" charset="-78"/>
+                <a:cs typeface="Dubai" panose="020B0503030403030204" pitchFamily="34" charset="-78"/>
+              </a:rPr>
+              <a:t>True</a:t>
+            </a:r>
+            <a:endParaRPr lang="de-DE" dirty="0"/>
+          </a:p>
+        </p:txBody>
+      </p:sp>
+      <p:sp>
+        <p:nvSpPr>
+          <p:cNvPr id="19" name="Rechteck 18"/>
+          <p:cNvSpPr/>
+          <p:nvPr/>
+        </p:nvSpPr>
+        <p:spPr>
+          <a:xfrm flipH="1">
+            <a:off x="4868289" y="4452585"/>
+            <a:ext cx="2489593" cy="533071"/>
+          </a:xfrm>
+          <a:prstGeom prst="rect">
+            <a:avLst/>
+          </a:prstGeom>
+          <a:solidFill>
+            <a:schemeClr val="bg1"/>
+          </a:solidFill>
+          <a:ln w="28575">
+            <a:solidFill>
+              <a:schemeClr val="tx1"/>
+            </a:solidFill>
+          </a:ln>
+          <a:effectLst/>
+        </p:spPr>
+        <p:style>
+          <a:lnRef idx="2">
+            <a:schemeClr val="accent1">
+              <a:shade val="50000"/>
+            </a:schemeClr>
+          </a:lnRef>
+          <a:fillRef idx="1">
+            <a:schemeClr val="accent1"/>
+          </a:fillRef>
+          <a:effectRef idx="0">
+            <a:schemeClr val="accent1"/>
+          </a:effectRef>
+          <a:fontRef idx="minor">
+            <a:schemeClr val="lt1"/>
+          </a:fontRef>
+        </p:style>
+        <p:txBody>
+          <a:bodyPr rtlCol="0" anchor="ctr"/>
+          <a:lstStyle/>
+          <a:p>
+            <a:pPr algn="ctr"/>
+            <a:r>
+              <a:rPr lang="de-DE" dirty="0" err="1" smtClean="0">
+                <a:solidFill>
+                  <a:schemeClr val="tx1"/>
+                </a:solidFill>
+                <a:latin typeface="Dubai" panose="020B0503030403030204" pitchFamily="34" charset="-78"/>
+                <a:cs typeface="Dubai" panose="020B0503030403030204" pitchFamily="34" charset="-78"/>
+              </a:rPr>
+              <a:t>print</a:t>
+            </a:r>
+            <a:r>
+              <a:rPr lang="de-DE" dirty="0" smtClean="0">
+                <a:solidFill>
+                  <a:schemeClr val="tx1"/>
+                </a:solidFill>
+                <a:latin typeface="Dubai" panose="020B0503030403030204" pitchFamily="34" charset="-78"/>
+                <a:cs typeface="Dubai" panose="020B0503030403030204" pitchFamily="34" charset="-78"/>
+              </a:rPr>
+              <a:t>('x ist </a:t>
+            </a:r>
+            <a:r>
+              <a:rPr lang="de-DE" dirty="0" smtClean="0">
+                <a:solidFill>
+                  <a:schemeClr val="tx1"/>
+                </a:solidFill>
+                <a:latin typeface="Dubai" panose="020B0503030403030204" pitchFamily="34" charset="-78"/>
+                <a:cs typeface="Dubai" panose="020B0503030403030204" pitchFamily="34" charset="-78"/>
+              </a:rPr>
+              <a:t>ungerade')</a:t>
+            </a:r>
+            <a:endParaRPr lang="de-DE" dirty="0">
+              <a:solidFill>
+                <a:schemeClr val="tx1"/>
+              </a:solidFill>
+              <a:latin typeface="Dubai" panose="020B0503030403030204" pitchFamily="34" charset="-78"/>
+              <a:cs typeface="Dubai" panose="020B0503030403030204" pitchFamily="34" charset="-78"/>
+            </a:endParaRPr>
+          </a:p>
+        </p:txBody>
+      </p:sp>
+      <p:cxnSp>
+        <p:nvCxnSpPr>
+          <p:cNvPr id="20" name="Gewinkelter Verbinder 19"/>
+          <p:cNvCxnSpPr/>
+          <p:nvPr/>
+        </p:nvCxnSpPr>
+        <p:spPr>
+          <a:xfrm flipH="1">
+            <a:off x="6113086" y="4061010"/>
+            <a:ext cx="1381896" cy="391576"/>
+          </a:xfrm>
+          <a:prstGeom prst="bentConnector2">
+            <a:avLst/>
+          </a:prstGeom>
+          <a:ln w="28575">
+            <a:solidFill>
+              <a:schemeClr val="tx1"/>
+            </a:solidFill>
+            <a:tailEnd type="triangle"/>
+          </a:ln>
+          <a:effectLst/>
+        </p:spPr>
+        <p:style>
+          <a:lnRef idx="1">
+            <a:schemeClr val="accent1"/>
+          </a:lnRef>
+          <a:fillRef idx="0">
+            <a:schemeClr val="accent1"/>
+          </a:fillRef>
+          <a:effectRef idx="0">
+            <a:schemeClr val="accent1"/>
+          </a:effectRef>
+          <a:fontRef idx="minor">
+            <a:schemeClr val="tx1"/>
+          </a:fontRef>
+        </p:style>
+      </p:cxnSp>
+      <p:cxnSp>
+        <p:nvCxnSpPr>
+          <p:cNvPr id="21" name="Gewinkelter Verbinder 20"/>
+          <p:cNvCxnSpPr/>
+          <p:nvPr/>
+        </p:nvCxnSpPr>
+        <p:spPr>
+          <a:xfrm rot="16200000" flipH="1">
+            <a:off x="6958825" y="4138171"/>
+            <a:ext cx="682043" cy="2373513"/>
+          </a:xfrm>
+          <a:prstGeom prst="bentConnector2">
+            <a:avLst/>
+          </a:prstGeom>
+          <a:ln w="28575">
+            <a:solidFill>
+              <a:schemeClr val="tx1"/>
+            </a:solidFill>
+            <a:tailEnd type="triangle"/>
+          </a:ln>
+          <a:effectLst/>
+        </p:spPr>
+        <p:style>
+          <a:lnRef idx="1">
+            <a:schemeClr val="accent1"/>
+          </a:lnRef>
+          <a:fillRef idx="0">
+            <a:schemeClr val="accent1"/>
+          </a:fillRef>
+          <a:effectRef idx="0">
+            <a:schemeClr val="accent1"/>
+          </a:effectRef>
+          <a:fontRef idx="minor">
+            <a:schemeClr val="tx1"/>
+          </a:fontRef>
+        </p:style>
+      </p:cxnSp>
+      <p:sp>
+        <p:nvSpPr>
+          <p:cNvPr id="22" name="Rechteck 21"/>
+          <p:cNvSpPr/>
+          <p:nvPr/>
+        </p:nvSpPr>
+        <p:spPr>
+          <a:xfrm flipH="1">
+            <a:off x="6500874" y="3690257"/>
+            <a:ext cx="658385" cy="369332"/>
+          </a:xfrm>
+          <a:prstGeom prst="rect">
+            <a:avLst/>
+          </a:prstGeom>
+        </p:spPr>
+        <p:txBody>
+          <a:bodyPr wrap="none">
+            <a:spAutoFit/>
+          </a:bodyPr>
+          <a:lstStyle/>
+          <a:p>
+            <a:r>
+              <a:rPr lang="de-DE" dirty="0" err="1" smtClean="0">
+                <a:latin typeface="Dubai" panose="020B0503030403030204" pitchFamily="34" charset="-78"/>
+                <a:cs typeface="Dubai" panose="020B0503030403030204" pitchFamily="34" charset="-78"/>
+              </a:rPr>
+              <a:t>False</a:t>
+            </a:r>
+            <a:endParaRPr lang="de-DE" dirty="0"/>
+          </a:p>
+        </p:txBody>
+      </p:sp>
+    </p:spTree>
+    <p:extLst>
+      <p:ext uri="{BB962C8B-B14F-4D97-AF65-F5344CB8AC3E}">
+        <p14:creationId xmlns:p14="http://schemas.microsoft.com/office/powerpoint/2010/main" val="3733507251"/>
+      </p:ext>
+    </p:extLst>
+  </p:cSld>
+  <p:clrMapOvr>
+    <a:masterClrMapping/>
+  </p:clrMapOvr>
+  <p:timing>
+    <p:tnLst>
+      <p:par>
+        <p:cTn id="1" dur="indefinite" restart="never" nodeType="tmRoot"/>
+      </p:par>
+    </p:tnLst>
+  </p:timing>
+</p:sld>
+</file>
+
+<file path=ppt/slides/slide3.xml><?xml version="1.0" encoding="utf-8"?>
+<p:sld xmlns:a="http://schemas.openxmlformats.org/drawingml/2006/main" xmlns:r="http://schemas.openxmlformats.org/officeDocument/2006/relationships" xmlns:p="http://schemas.openxmlformats.org/presentationml/2006/main">
+  <p:cSld>
+    <p:spTree>
+      <p:nvGrpSpPr>
+        <p:cNvPr id="1" name=""/>
+        <p:cNvGrpSpPr/>
+        <p:nvPr/>
+      </p:nvGrpSpPr>
+      <p:grpSpPr>
+        <a:xfrm>
+          <a:off x="0" y="0"/>
+          <a:ext cx="0" cy="0"/>
+          <a:chOff x="0" y="0"/>
+          <a:chExt cx="0" cy="0"/>
+        </a:xfrm>
+      </p:grpSpPr>
+      <p:sp>
+        <p:nvSpPr>
+          <p:cNvPr id="3" name="Flussdiagramm: Verzweigung 2"/>
+          <p:cNvSpPr/>
+          <p:nvPr/>
+        </p:nvSpPr>
+        <p:spPr>
+          <a:xfrm>
+            <a:off x="490193" y="914400"/>
+            <a:ext cx="1659117" cy="848412"/>
+          </a:xfrm>
+          <a:prstGeom prst="flowChartDecision">
+            <a:avLst/>
+          </a:prstGeom>
+          <a:solidFill>
+            <a:schemeClr val="bg1"/>
+          </a:solidFill>
+          <a:ln w="28575">
+            <a:solidFill>
+              <a:schemeClr val="tx1"/>
+            </a:solidFill>
+          </a:ln>
+          <a:effectLst/>
+        </p:spPr>
+        <p:style>
+          <a:lnRef idx="2">
+            <a:schemeClr val="accent1">
+              <a:shade val="50000"/>
+            </a:schemeClr>
+          </a:lnRef>
+          <a:fillRef idx="1">
+            <a:schemeClr val="accent1"/>
+          </a:fillRef>
+          <a:effectRef idx="0">
+            <a:schemeClr val="accent1"/>
+          </a:effectRef>
+          <a:fontRef idx="minor">
+            <a:schemeClr val="lt1"/>
+          </a:fontRef>
+        </p:style>
+        <p:txBody>
+          <a:bodyPr rtlCol="0" anchor="ctr"/>
+          <a:lstStyle/>
+          <a:p>
+            <a:pPr algn="ctr"/>
+            <a:r>
+              <a:rPr lang="de-DE" dirty="0" smtClean="0">
+                <a:solidFill>
+                  <a:schemeClr val="tx1"/>
+                </a:solidFill>
+                <a:latin typeface="Dubai" panose="020B0503030403030204" pitchFamily="34" charset="-78"/>
+                <a:cs typeface="Dubai" panose="020B0503030403030204" pitchFamily="34" charset="-78"/>
+              </a:rPr>
+              <a:t>x </a:t>
+            </a:r>
+            <a:r>
+              <a:rPr lang="de-DE" dirty="0">
+                <a:solidFill>
+                  <a:schemeClr val="tx1"/>
+                </a:solidFill>
+                <a:latin typeface="Dubai" panose="020B0503030403030204" pitchFamily="34" charset="-78"/>
+                <a:cs typeface="Dubai" panose="020B0503030403030204" pitchFamily="34" charset="-78"/>
+              </a:rPr>
+              <a:t>&lt;</a:t>
+            </a:r>
+            <a:r>
+              <a:rPr lang="de-DE" dirty="0" smtClean="0">
+                <a:solidFill>
+                  <a:schemeClr val="tx1"/>
+                </a:solidFill>
+                <a:latin typeface="Dubai" panose="020B0503030403030204" pitchFamily="34" charset="-78"/>
+                <a:cs typeface="Dubai" panose="020B0503030403030204" pitchFamily="34" charset="-78"/>
+              </a:rPr>
+              <a:t> y</a:t>
+            </a:r>
+            <a:endParaRPr lang="de-DE" dirty="0">
+              <a:solidFill>
+                <a:schemeClr val="tx1"/>
+              </a:solidFill>
+              <a:latin typeface="Dubai" panose="020B0503030403030204" pitchFamily="34" charset="-78"/>
+              <a:cs typeface="Dubai" panose="020B0503030403030204" pitchFamily="34" charset="-78"/>
+            </a:endParaRPr>
+          </a:p>
+        </p:txBody>
+      </p:sp>
+      <p:cxnSp>
+        <p:nvCxnSpPr>
+          <p:cNvPr id="5" name="Gerade Verbindung mit Pfeil 4"/>
+          <p:cNvCxnSpPr/>
+          <p:nvPr/>
+        </p:nvCxnSpPr>
+        <p:spPr>
+          <a:xfrm>
+            <a:off x="1319752" y="518474"/>
+            <a:ext cx="0" cy="395926"/>
+          </a:xfrm>
+          <a:prstGeom prst="straightConnector1">
+            <a:avLst/>
+          </a:prstGeom>
+          <a:ln w="28575">
+            <a:solidFill>
+              <a:schemeClr val="tx1"/>
+            </a:solidFill>
+            <a:tailEnd type="triangle"/>
+          </a:ln>
+          <a:effectLst/>
+        </p:spPr>
+        <p:style>
+          <a:lnRef idx="1">
+            <a:schemeClr val="accent1"/>
+          </a:lnRef>
+          <a:fillRef idx="0">
+            <a:schemeClr val="accent1"/>
+          </a:fillRef>
+          <a:effectRef idx="0">
+            <a:schemeClr val="accent1"/>
+          </a:effectRef>
+          <a:fontRef idx="minor">
+            <a:schemeClr val="tx1"/>
+          </a:fontRef>
+        </p:style>
+      </p:cxnSp>
+      <p:sp>
+        <p:nvSpPr>
+          <p:cNvPr id="7" name="Rechteck 6"/>
+          <p:cNvSpPr/>
+          <p:nvPr/>
+        </p:nvSpPr>
+        <p:spPr>
+          <a:xfrm>
+            <a:off x="2264004" y="1666187"/>
+            <a:ext cx="2204302" cy="620598"/>
+          </a:xfrm>
+          <a:prstGeom prst="rect">
+            <a:avLst/>
+          </a:prstGeom>
+          <a:solidFill>
+            <a:schemeClr val="bg1"/>
+          </a:solidFill>
+          <a:ln w="28575">
+            <a:solidFill>
+              <a:schemeClr val="tx1"/>
+            </a:solidFill>
+          </a:ln>
+          <a:effectLst/>
+        </p:spPr>
+        <p:style>
+          <a:lnRef idx="2">
+            <a:schemeClr val="accent1">
+              <a:shade val="50000"/>
+            </a:schemeClr>
+          </a:lnRef>
+          <a:fillRef idx="1">
+            <a:schemeClr val="accent1"/>
+          </a:fillRef>
+          <a:effectRef idx="0">
+            <a:schemeClr val="accent1"/>
+          </a:effectRef>
+          <a:fontRef idx="minor">
+            <a:schemeClr val="lt1"/>
+          </a:fontRef>
+        </p:style>
+        <p:txBody>
+          <a:bodyPr rtlCol="0" anchor="ctr"/>
+          <a:lstStyle/>
+          <a:p>
+            <a:pPr algn="ctr"/>
+            <a:r>
+              <a:rPr lang="de-DE" dirty="0" err="1" smtClean="0">
+                <a:solidFill>
+                  <a:schemeClr val="tx1"/>
+                </a:solidFill>
+                <a:latin typeface="Dubai" panose="020B0503030403030204" pitchFamily="34" charset="-78"/>
+                <a:cs typeface="Dubai" panose="020B0503030403030204" pitchFamily="34" charset="-78"/>
+              </a:rPr>
+              <a:t>print</a:t>
+            </a:r>
+            <a:r>
+              <a:rPr lang="de-DE" dirty="0" smtClean="0">
+                <a:solidFill>
+                  <a:schemeClr val="tx1"/>
+                </a:solidFill>
+                <a:latin typeface="Dubai" panose="020B0503030403030204" pitchFamily="34" charset="-78"/>
+                <a:cs typeface="Dubai" panose="020B0503030403030204" pitchFamily="34" charset="-78"/>
+              </a:rPr>
+              <a:t>('x ist </a:t>
+            </a:r>
+            <a:r>
+              <a:rPr lang="de-DE" dirty="0" smtClean="0">
+                <a:solidFill>
+                  <a:schemeClr val="tx1"/>
+                </a:solidFill>
+                <a:latin typeface="Dubai" panose="020B0503030403030204" pitchFamily="34" charset="-78"/>
+                <a:cs typeface="Dubai" panose="020B0503030403030204" pitchFamily="34" charset="-78"/>
+              </a:rPr>
+              <a:t>kleiner</a:t>
+            </a:r>
+            <a:r>
+              <a:rPr lang="de-DE" dirty="0" smtClean="0">
+                <a:solidFill>
+                  <a:schemeClr val="tx1"/>
+                </a:solidFill>
+                <a:latin typeface="Dubai" panose="020B0503030403030204" pitchFamily="34" charset="-78"/>
+                <a:cs typeface="Dubai" panose="020B0503030403030204" pitchFamily="34" charset="-78"/>
+              </a:rPr>
+              <a:t>')</a:t>
+            </a:r>
+            <a:endParaRPr lang="de-DE" dirty="0">
+              <a:solidFill>
+                <a:schemeClr val="tx1"/>
+              </a:solidFill>
+              <a:latin typeface="Dubai" panose="020B0503030403030204" pitchFamily="34" charset="-78"/>
+              <a:cs typeface="Dubai" panose="020B0503030403030204" pitchFamily="34" charset="-78"/>
+            </a:endParaRPr>
+          </a:p>
+        </p:txBody>
+      </p:sp>
+      <p:cxnSp>
+        <p:nvCxnSpPr>
+          <p:cNvPr id="9" name="Gewinkelter Verbinder 8"/>
+          <p:cNvCxnSpPr>
+            <a:stCxn id="3" idx="3"/>
+            <a:endCxn id="7" idx="0"/>
+          </p:cNvCxnSpPr>
+          <p:nvPr/>
+        </p:nvCxnSpPr>
+        <p:spPr>
+          <a:xfrm>
+            <a:off x="2149310" y="1338606"/>
+            <a:ext cx="1216845" cy="327581"/>
+          </a:xfrm>
+          <a:prstGeom prst="bentConnector2">
+            <a:avLst/>
+          </a:prstGeom>
+          <a:ln w="28575">
+            <a:solidFill>
+              <a:schemeClr val="tx1"/>
+            </a:solidFill>
+            <a:tailEnd type="triangle"/>
+          </a:ln>
+          <a:effectLst/>
+        </p:spPr>
+        <p:style>
+          <a:lnRef idx="1">
+            <a:schemeClr val="accent1"/>
+          </a:lnRef>
+          <a:fillRef idx="0">
+            <a:schemeClr val="accent1"/>
+          </a:fillRef>
+          <a:effectRef idx="0">
+            <a:schemeClr val="accent1"/>
+          </a:effectRef>
+          <a:fontRef idx="minor">
+            <a:schemeClr val="tx1"/>
+          </a:fontRef>
+        </p:style>
+      </p:cxnSp>
+      <p:cxnSp>
+        <p:nvCxnSpPr>
+          <p:cNvPr id="10" name="Gerade Verbindung mit Pfeil 9"/>
+          <p:cNvCxnSpPr>
+            <a:endCxn id="23" idx="0"/>
+          </p:cNvCxnSpPr>
+          <p:nvPr/>
+        </p:nvCxnSpPr>
+        <p:spPr>
+          <a:xfrm>
+            <a:off x="1319751" y="1762812"/>
+            <a:ext cx="1" cy="539514"/>
+          </a:xfrm>
+          <a:prstGeom prst="straightConnector1">
+            <a:avLst/>
+          </a:prstGeom>
+          <a:ln w="28575">
+            <a:solidFill>
+              <a:schemeClr val="tx1"/>
+            </a:solidFill>
+            <a:tailEnd type="triangle"/>
+          </a:ln>
+          <a:effectLst/>
+        </p:spPr>
+        <p:style>
+          <a:lnRef idx="1">
+            <a:schemeClr val="accent1"/>
+          </a:lnRef>
+          <a:fillRef idx="0">
+            <a:schemeClr val="accent1"/>
+          </a:fillRef>
+          <a:effectRef idx="0">
+            <a:schemeClr val="accent1"/>
+          </a:effectRef>
+          <a:fontRef idx="minor">
+            <a:schemeClr val="tx1"/>
+          </a:fontRef>
+        </p:style>
+      </p:cxnSp>
+      <p:cxnSp>
+        <p:nvCxnSpPr>
+          <p:cNvPr id="12" name="Gewinkelter Verbinder 11"/>
+          <p:cNvCxnSpPr>
+            <a:stCxn id="7" idx="3"/>
+          </p:cNvCxnSpPr>
+          <p:nvPr/>
+        </p:nvCxnSpPr>
+        <p:spPr>
+          <a:xfrm>
+            <a:off x="4468306" y="1976486"/>
+            <a:ext cx="224344" cy="1387926"/>
+          </a:xfrm>
+          <a:prstGeom prst="bentConnector2">
+            <a:avLst/>
+          </a:prstGeom>
+          <a:ln w="28575">
+            <a:solidFill>
+              <a:schemeClr val="tx1"/>
+            </a:solidFill>
+            <a:tailEnd type="triangle"/>
+          </a:ln>
+          <a:effectLst/>
+        </p:spPr>
+        <p:style>
+          <a:lnRef idx="1">
+            <a:schemeClr val="accent1"/>
+          </a:lnRef>
+          <a:fillRef idx="0">
+            <a:schemeClr val="accent1"/>
+          </a:fillRef>
+          <a:effectRef idx="0">
+            <a:schemeClr val="accent1"/>
+          </a:effectRef>
+          <a:fontRef idx="minor">
+            <a:schemeClr val="tx1"/>
+          </a:fontRef>
+        </p:style>
+      </p:cxnSp>
+      <p:sp>
+        <p:nvSpPr>
+          <p:cNvPr id="2" name="Rechteck 1"/>
+          <p:cNvSpPr/>
+          <p:nvPr/>
+        </p:nvSpPr>
+        <p:spPr>
+          <a:xfrm>
+            <a:off x="2264004" y="1047830"/>
+            <a:ext cx="606320" cy="369332"/>
+          </a:xfrm>
+          <a:prstGeom prst="rect">
+            <a:avLst/>
+          </a:prstGeom>
+        </p:spPr>
+        <p:txBody>
+          <a:bodyPr wrap="none">
+            <a:spAutoFit/>
+          </a:bodyPr>
+          <a:lstStyle/>
+          <a:p>
+            <a:r>
+              <a:rPr lang="de-DE" dirty="0" smtClean="0">
+                <a:latin typeface="Dubai" panose="020B0503030403030204" pitchFamily="34" charset="-78"/>
+                <a:cs typeface="Dubai" panose="020B0503030403030204" pitchFamily="34" charset="-78"/>
+              </a:rPr>
+              <a:t>True</a:t>
+            </a:r>
+            <a:endParaRPr lang="de-DE" dirty="0"/>
+          </a:p>
+        </p:txBody>
+      </p:sp>
+      <p:sp>
+        <p:nvSpPr>
+          <p:cNvPr id="23" name="Flussdiagramm: Verzweigung 22"/>
+          <p:cNvSpPr/>
+          <p:nvPr/>
+        </p:nvSpPr>
+        <p:spPr>
+          <a:xfrm>
+            <a:off x="490193" y="2302326"/>
+            <a:ext cx="1659117" cy="848412"/>
+          </a:xfrm>
+          <a:prstGeom prst="flowChartDecision">
+            <a:avLst/>
+          </a:prstGeom>
+          <a:solidFill>
+            <a:schemeClr val="bg1"/>
+          </a:solidFill>
+          <a:ln w="28575">
+            <a:solidFill>
+              <a:schemeClr val="tx1"/>
+            </a:solidFill>
+          </a:ln>
+          <a:effectLst/>
+        </p:spPr>
+        <p:style>
+          <a:lnRef idx="2">
+            <a:schemeClr val="accent1">
+              <a:shade val="50000"/>
+            </a:schemeClr>
+          </a:lnRef>
+          <a:fillRef idx="1">
+            <a:schemeClr val="accent1"/>
+          </a:fillRef>
+          <a:effectRef idx="0">
+            <a:schemeClr val="accent1"/>
+          </a:effectRef>
+          <a:fontRef idx="minor">
+            <a:schemeClr val="lt1"/>
+          </a:fontRef>
+        </p:style>
+        <p:txBody>
+          <a:bodyPr rtlCol="0" anchor="ctr"/>
+          <a:lstStyle/>
+          <a:p>
+            <a:pPr algn="ctr"/>
+            <a:r>
+              <a:rPr lang="de-DE" dirty="0" smtClean="0">
+                <a:solidFill>
+                  <a:schemeClr val="tx1"/>
+                </a:solidFill>
+                <a:latin typeface="Dubai" panose="020B0503030403030204" pitchFamily="34" charset="-78"/>
+                <a:cs typeface="Dubai" panose="020B0503030403030204" pitchFamily="34" charset="-78"/>
+              </a:rPr>
+              <a:t>x </a:t>
+            </a:r>
+            <a:r>
+              <a:rPr lang="de-DE" dirty="0" smtClean="0">
+                <a:solidFill>
+                  <a:schemeClr val="tx1"/>
+                </a:solidFill>
+                <a:latin typeface="Dubai" panose="020B0503030403030204" pitchFamily="34" charset="-78"/>
+                <a:cs typeface="Dubai" panose="020B0503030403030204" pitchFamily="34" charset="-78"/>
+              </a:rPr>
+              <a:t>&gt; y</a:t>
+            </a:r>
+            <a:endParaRPr lang="de-DE" dirty="0">
+              <a:solidFill>
+                <a:schemeClr val="tx1"/>
+              </a:solidFill>
+              <a:latin typeface="Dubai" panose="020B0503030403030204" pitchFamily="34" charset="-78"/>
+              <a:cs typeface="Dubai" panose="020B0503030403030204" pitchFamily="34" charset="-78"/>
+            </a:endParaRPr>
+          </a:p>
+        </p:txBody>
+      </p:sp>
+      <p:sp>
+        <p:nvSpPr>
+          <p:cNvPr id="25" name="Rechteck 24"/>
+          <p:cNvSpPr/>
+          <p:nvPr/>
+        </p:nvSpPr>
+        <p:spPr>
+          <a:xfrm>
+            <a:off x="2264004" y="3054113"/>
+            <a:ext cx="2204302" cy="620598"/>
+          </a:xfrm>
+          <a:prstGeom prst="rect">
+            <a:avLst/>
+          </a:prstGeom>
+          <a:solidFill>
+            <a:schemeClr val="bg1"/>
+          </a:solidFill>
+          <a:ln w="28575">
+            <a:solidFill>
+              <a:schemeClr val="tx1"/>
+            </a:solidFill>
+          </a:ln>
+          <a:effectLst/>
+        </p:spPr>
+        <p:style>
+          <a:lnRef idx="2">
+            <a:schemeClr val="accent1">
+              <a:shade val="50000"/>
+            </a:schemeClr>
+          </a:lnRef>
+          <a:fillRef idx="1">
+            <a:schemeClr val="accent1"/>
+          </a:fillRef>
+          <a:effectRef idx="0">
+            <a:schemeClr val="accent1"/>
+          </a:effectRef>
+          <a:fontRef idx="minor">
+            <a:schemeClr val="lt1"/>
+          </a:fontRef>
+        </p:style>
+        <p:txBody>
+          <a:bodyPr rtlCol="0" anchor="ctr"/>
+          <a:lstStyle/>
+          <a:p>
+            <a:pPr algn="ctr"/>
+            <a:r>
+              <a:rPr lang="de-DE" dirty="0" err="1" smtClean="0">
+                <a:solidFill>
+                  <a:schemeClr val="tx1"/>
+                </a:solidFill>
+                <a:latin typeface="Dubai" panose="020B0503030403030204" pitchFamily="34" charset="-78"/>
+                <a:cs typeface="Dubai" panose="020B0503030403030204" pitchFamily="34" charset="-78"/>
+              </a:rPr>
+              <a:t>print</a:t>
+            </a:r>
+            <a:r>
+              <a:rPr lang="de-DE" dirty="0" smtClean="0">
+                <a:solidFill>
+                  <a:schemeClr val="tx1"/>
+                </a:solidFill>
+                <a:latin typeface="Dubai" panose="020B0503030403030204" pitchFamily="34" charset="-78"/>
+                <a:cs typeface="Dubai" panose="020B0503030403030204" pitchFamily="34" charset="-78"/>
+              </a:rPr>
+              <a:t>('x ist </a:t>
+            </a:r>
+            <a:r>
+              <a:rPr lang="de-DE" dirty="0" err="1" smtClean="0">
+                <a:solidFill>
+                  <a:schemeClr val="tx1"/>
+                </a:solidFill>
+                <a:latin typeface="Dubai" panose="020B0503030403030204" pitchFamily="34" charset="-78"/>
+                <a:cs typeface="Dubai" panose="020B0503030403030204" pitchFamily="34" charset="-78"/>
+              </a:rPr>
+              <a:t>groesser</a:t>
+            </a:r>
+            <a:r>
+              <a:rPr lang="de-DE" dirty="0" smtClean="0">
+                <a:solidFill>
+                  <a:schemeClr val="tx1"/>
+                </a:solidFill>
+                <a:latin typeface="Dubai" panose="020B0503030403030204" pitchFamily="34" charset="-78"/>
+                <a:cs typeface="Dubai" panose="020B0503030403030204" pitchFamily="34" charset="-78"/>
+              </a:rPr>
+              <a:t>')</a:t>
+            </a:r>
+            <a:endParaRPr lang="de-DE" dirty="0">
+              <a:solidFill>
+                <a:schemeClr val="tx1"/>
+              </a:solidFill>
+              <a:latin typeface="Dubai" panose="020B0503030403030204" pitchFamily="34" charset="-78"/>
+              <a:cs typeface="Dubai" panose="020B0503030403030204" pitchFamily="34" charset="-78"/>
+            </a:endParaRPr>
+          </a:p>
+        </p:txBody>
+      </p:sp>
+      <p:cxnSp>
+        <p:nvCxnSpPr>
+          <p:cNvPr id="26" name="Gewinkelter Verbinder 25"/>
+          <p:cNvCxnSpPr>
+            <a:stCxn id="23" idx="3"/>
+            <a:endCxn id="25" idx="0"/>
+          </p:cNvCxnSpPr>
+          <p:nvPr/>
+        </p:nvCxnSpPr>
+        <p:spPr>
+          <a:xfrm>
+            <a:off x="2149310" y="2726532"/>
+            <a:ext cx="1216845" cy="327581"/>
+          </a:xfrm>
+          <a:prstGeom prst="bentConnector2">
+            <a:avLst/>
+          </a:prstGeom>
+          <a:ln w="28575">
+            <a:solidFill>
+              <a:schemeClr val="tx1"/>
+            </a:solidFill>
+            <a:tailEnd type="triangle"/>
+          </a:ln>
+          <a:effectLst/>
+        </p:spPr>
+        <p:style>
+          <a:lnRef idx="1">
+            <a:schemeClr val="accent1"/>
+          </a:lnRef>
+          <a:fillRef idx="0">
+            <a:schemeClr val="accent1"/>
+          </a:fillRef>
+          <a:effectRef idx="0">
+            <a:schemeClr val="accent1"/>
+          </a:effectRef>
+          <a:fontRef idx="minor">
+            <a:schemeClr val="tx1"/>
+          </a:fontRef>
+        </p:style>
+      </p:cxnSp>
+      <p:cxnSp>
+        <p:nvCxnSpPr>
+          <p:cNvPr id="27" name="Gerade Verbindung mit Pfeil 26"/>
+          <p:cNvCxnSpPr/>
+          <p:nvPr/>
+        </p:nvCxnSpPr>
+        <p:spPr>
+          <a:xfrm>
+            <a:off x="1319751" y="3150738"/>
+            <a:ext cx="0" cy="1168924"/>
+          </a:xfrm>
+          <a:prstGeom prst="straightConnector1">
+            <a:avLst/>
+          </a:prstGeom>
+          <a:ln w="28575">
+            <a:solidFill>
+              <a:schemeClr val="tx1"/>
+            </a:solidFill>
+            <a:tailEnd type="triangle"/>
+          </a:ln>
+          <a:effectLst/>
+        </p:spPr>
+        <p:style>
+          <a:lnRef idx="1">
+            <a:schemeClr val="accent1"/>
+          </a:lnRef>
+          <a:fillRef idx="0">
+            <a:schemeClr val="accent1"/>
+          </a:fillRef>
+          <a:effectRef idx="0">
+            <a:schemeClr val="accent1"/>
+          </a:effectRef>
+          <a:fontRef idx="minor">
+            <a:schemeClr val="tx1"/>
+          </a:fontRef>
+        </p:style>
+      </p:cxnSp>
+      <p:cxnSp>
+        <p:nvCxnSpPr>
+          <p:cNvPr id="28" name="Gewinkelter Verbinder 27"/>
+          <p:cNvCxnSpPr>
+            <a:stCxn id="25" idx="3"/>
+          </p:cNvCxnSpPr>
+          <p:nvPr/>
+        </p:nvCxnSpPr>
+        <p:spPr>
+          <a:xfrm flipH="1">
+            <a:off x="1319752" y="3364412"/>
+            <a:ext cx="3148554" cy="1894617"/>
+          </a:xfrm>
+          <a:prstGeom prst="bentConnector3">
+            <a:avLst>
+              <a:gd name="adj1" fmla="val -7260"/>
+            </a:avLst>
+          </a:prstGeom>
+          <a:ln w="28575">
+            <a:solidFill>
+              <a:schemeClr val="tx1"/>
+            </a:solidFill>
+            <a:tailEnd type="triangle"/>
+          </a:ln>
+          <a:effectLst/>
+        </p:spPr>
+        <p:style>
+          <a:lnRef idx="1">
+            <a:schemeClr val="accent1"/>
+          </a:lnRef>
+          <a:fillRef idx="0">
+            <a:schemeClr val="accent1"/>
+          </a:fillRef>
+          <a:effectRef idx="0">
+            <a:schemeClr val="accent1"/>
+          </a:effectRef>
+          <a:fontRef idx="minor">
+            <a:schemeClr val="tx1"/>
+          </a:fontRef>
+        </p:style>
+      </p:cxnSp>
+      <p:sp>
+        <p:nvSpPr>
+          <p:cNvPr id="29" name="Rechteck 28"/>
+          <p:cNvSpPr/>
+          <p:nvPr/>
+        </p:nvSpPr>
+        <p:spPr>
+          <a:xfrm>
+            <a:off x="2264004" y="2435756"/>
+            <a:ext cx="606320" cy="369332"/>
+          </a:xfrm>
+          <a:prstGeom prst="rect">
+            <a:avLst/>
+          </a:prstGeom>
+        </p:spPr>
+        <p:txBody>
+          <a:bodyPr wrap="none">
+            <a:spAutoFit/>
+          </a:bodyPr>
+          <a:lstStyle/>
+          <a:p>
+            <a:r>
+              <a:rPr lang="de-DE" dirty="0" smtClean="0">
+                <a:latin typeface="Dubai" panose="020B0503030403030204" pitchFamily="34" charset="-78"/>
+                <a:cs typeface="Dubai" panose="020B0503030403030204" pitchFamily="34" charset="-78"/>
+              </a:rPr>
+              <a:t>True</a:t>
+            </a:r>
+            <a:endParaRPr lang="de-DE" dirty="0"/>
+          </a:p>
+        </p:txBody>
+      </p:sp>
+      <p:sp>
+        <p:nvSpPr>
+          <p:cNvPr id="31" name="Rechteck 30"/>
+          <p:cNvSpPr/>
+          <p:nvPr/>
+        </p:nvSpPr>
+        <p:spPr>
+          <a:xfrm>
+            <a:off x="217600" y="4319662"/>
+            <a:ext cx="2204302" cy="620598"/>
+          </a:xfrm>
+          <a:prstGeom prst="rect">
+            <a:avLst/>
+          </a:prstGeom>
+          <a:solidFill>
+            <a:schemeClr val="bg1"/>
+          </a:solidFill>
+          <a:ln w="28575">
+            <a:solidFill>
+              <a:schemeClr val="tx1"/>
+            </a:solidFill>
+          </a:ln>
+          <a:effectLst/>
+        </p:spPr>
+        <p:style>
+          <a:lnRef idx="2">
+            <a:schemeClr val="accent1">
+              <a:shade val="50000"/>
+            </a:schemeClr>
+          </a:lnRef>
+          <a:fillRef idx="1">
+            <a:schemeClr val="accent1"/>
+          </a:fillRef>
+          <a:effectRef idx="0">
+            <a:schemeClr val="accent1"/>
+          </a:effectRef>
+          <a:fontRef idx="minor">
+            <a:schemeClr val="lt1"/>
+          </a:fontRef>
+        </p:style>
+        <p:txBody>
+          <a:bodyPr rtlCol="0" anchor="ctr"/>
+          <a:lstStyle/>
+          <a:p>
+            <a:pPr algn="ctr"/>
+            <a:r>
+              <a:rPr lang="de-DE" dirty="0" err="1" smtClean="0">
+                <a:solidFill>
+                  <a:schemeClr val="tx1"/>
+                </a:solidFill>
+                <a:latin typeface="Dubai" panose="020B0503030403030204" pitchFamily="34" charset="-78"/>
+                <a:cs typeface="Dubai" panose="020B0503030403030204" pitchFamily="34" charset="-78"/>
+              </a:rPr>
+              <a:t>print</a:t>
+            </a:r>
+            <a:r>
+              <a:rPr lang="de-DE" dirty="0" smtClean="0">
+                <a:solidFill>
+                  <a:schemeClr val="tx1"/>
+                </a:solidFill>
+                <a:latin typeface="Dubai" panose="020B0503030403030204" pitchFamily="34" charset="-78"/>
+                <a:cs typeface="Dubai" panose="020B0503030403030204" pitchFamily="34" charset="-78"/>
+              </a:rPr>
+              <a:t>('x ist </a:t>
+            </a:r>
+            <a:r>
+              <a:rPr lang="de-DE" dirty="0" smtClean="0">
+                <a:solidFill>
+                  <a:schemeClr val="tx1"/>
+                </a:solidFill>
+                <a:latin typeface="Dubai" panose="020B0503030403030204" pitchFamily="34" charset="-78"/>
+                <a:cs typeface="Dubai" panose="020B0503030403030204" pitchFamily="34" charset="-78"/>
+              </a:rPr>
+              <a:t>gleich</a:t>
+            </a:r>
+            <a:r>
+              <a:rPr lang="de-DE" dirty="0" smtClean="0">
+                <a:solidFill>
+                  <a:schemeClr val="tx1"/>
+                </a:solidFill>
+                <a:latin typeface="Dubai" panose="020B0503030403030204" pitchFamily="34" charset="-78"/>
+                <a:cs typeface="Dubai" panose="020B0503030403030204" pitchFamily="34" charset="-78"/>
+              </a:rPr>
+              <a:t>')</a:t>
+            </a:r>
+            <a:endParaRPr lang="de-DE" dirty="0">
+              <a:solidFill>
+                <a:schemeClr val="tx1"/>
+              </a:solidFill>
+              <a:latin typeface="Dubai" panose="020B0503030403030204" pitchFamily="34" charset="-78"/>
+              <a:cs typeface="Dubai" panose="020B0503030403030204" pitchFamily="34" charset="-78"/>
+            </a:endParaRPr>
+          </a:p>
+        </p:txBody>
+      </p:sp>
+      <p:cxnSp>
+        <p:nvCxnSpPr>
+          <p:cNvPr id="32" name="Gerade Verbindung mit Pfeil 31"/>
+          <p:cNvCxnSpPr>
+            <a:stCxn id="31" idx="2"/>
+          </p:cNvCxnSpPr>
+          <p:nvPr/>
+        </p:nvCxnSpPr>
+        <p:spPr>
+          <a:xfrm>
+            <a:off x="1319751" y="4940260"/>
+            <a:ext cx="0" cy="601589"/>
+          </a:xfrm>
+          <a:prstGeom prst="straightConnector1">
+            <a:avLst/>
+          </a:prstGeom>
+          <a:ln w="28575">
+            <a:solidFill>
+              <a:schemeClr val="tx1"/>
+            </a:solidFill>
+            <a:tailEnd type="triangle"/>
+          </a:ln>
+          <a:effectLst/>
         </p:spPr>
         <p:style>
           <a:lnRef idx="1">
@@ -4324,7 +5744,947 @@
     </p:spTree>
     <p:extLst>
       <p:ext uri="{BB962C8B-B14F-4D97-AF65-F5344CB8AC3E}">
-        <p14:creationId xmlns:p14="http://schemas.microsoft.com/office/powerpoint/2010/main" val="3733507251"/>
+        <p14:creationId xmlns:p14="http://schemas.microsoft.com/office/powerpoint/2010/main" val="847651067"/>
+      </p:ext>
+    </p:extLst>
+  </p:cSld>
+  <p:clrMapOvr>
+    <a:masterClrMapping/>
+  </p:clrMapOvr>
+  <p:timing>
+    <p:tnLst>
+      <p:par>
+        <p:cTn id="1" dur="indefinite" restart="never" nodeType="tmRoot"/>
+      </p:par>
+    </p:tnLst>
+  </p:timing>
+</p:sld>
+</file>
+
+<file path=ppt/slides/slide4.xml><?xml version="1.0" encoding="utf-8"?>
+<p:sld xmlns:a="http://schemas.openxmlformats.org/drawingml/2006/main" xmlns:r="http://schemas.openxmlformats.org/officeDocument/2006/relationships" xmlns:p="http://schemas.openxmlformats.org/presentationml/2006/main">
+  <p:cSld>
+    <p:spTree>
+      <p:nvGrpSpPr>
+        <p:cNvPr id="1" name=""/>
+        <p:cNvGrpSpPr/>
+        <p:nvPr/>
+      </p:nvGrpSpPr>
+      <p:grpSpPr>
+        <a:xfrm>
+          <a:off x="0" y="0"/>
+          <a:ext cx="0" cy="0"/>
+          <a:chOff x="0" y="0"/>
+          <a:chExt cx="0" cy="0"/>
+        </a:xfrm>
+      </p:grpSpPr>
+      <p:sp>
+        <p:nvSpPr>
+          <p:cNvPr id="8" name="Flussdiagramm: Verzweigung 7"/>
+          <p:cNvSpPr/>
+          <p:nvPr/>
+        </p:nvSpPr>
+        <p:spPr>
+          <a:xfrm>
+            <a:off x="3445855" y="715143"/>
+            <a:ext cx="1983240" cy="1014157"/>
+          </a:xfrm>
+          <a:prstGeom prst="flowChartDecision">
+            <a:avLst/>
+          </a:prstGeom>
+          <a:solidFill>
+            <a:schemeClr val="bg1"/>
+          </a:solidFill>
+          <a:ln w="28575">
+            <a:solidFill>
+              <a:schemeClr val="tx1"/>
+            </a:solidFill>
+          </a:ln>
+          <a:effectLst/>
+        </p:spPr>
+        <p:style>
+          <a:lnRef idx="2">
+            <a:schemeClr val="accent1">
+              <a:shade val="50000"/>
+            </a:schemeClr>
+          </a:lnRef>
+          <a:fillRef idx="1">
+            <a:schemeClr val="accent1"/>
+          </a:fillRef>
+          <a:effectRef idx="0">
+            <a:schemeClr val="accent1"/>
+          </a:effectRef>
+          <a:fontRef idx="minor">
+            <a:schemeClr val="lt1"/>
+          </a:fontRef>
+        </p:style>
+        <p:txBody>
+          <a:bodyPr lIns="0" rIns="0" rtlCol="0" anchor="ctr"/>
+          <a:lstStyle/>
+          <a:p>
+            <a:pPr algn="ctr"/>
+            <a:r>
+              <a:rPr lang="de-DE" dirty="0" smtClean="0">
+                <a:solidFill>
+                  <a:schemeClr val="tx1"/>
+                </a:solidFill>
+                <a:latin typeface="Dubai" panose="020B0503030403030204" pitchFamily="34" charset="-78"/>
+                <a:cs typeface="Dubai" panose="020B0503030403030204" pitchFamily="34" charset="-78"/>
+              </a:rPr>
+              <a:t>x == y</a:t>
+            </a:r>
+            <a:endParaRPr lang="de-DE" dirty="0">
+              <a:solidFill>
+                <a:schemeClr val="tx1"/>
+              </a:solidFill>
+              <a:latin typeface="Dubai" panose="020B0503030403030204" pitchFamily="34" charset="-78"/>
+              <a:cs typeface="Dubai" panose="020B0503030403030204" pitchFamily="34" charset="-78"/>
+            </a:endParaRPr>
+          </a:p>
+        </p:txBody>
+      </p:sp>
+      <p:cxnSp>
+        <p:nvCxnSpPr>
+          <p:cNvPr id="11" name="Gerade Verbindung mit Pfeil 10"/>
+          <p:cNvCxnSpPr/>
+          <p:nvPr/>
+        </p:nvCxnSpPr>
+        <p:spPr>
+          <a:xfrm>
+            <a:off x="4437476" y="241869"/>
+            <a:ext cx="0" cy="473274"/>
+          </a:xfrm>
+          <a:prstGeom prst="straightConnector1">
+            <a:avLst/>
+          </a:prstGeom>
+          <a:ln w="28575">
+            <a:solidFill>
+              <a:schemeClr val="tx1"/>
+            </a:solidFill>
+            <a:tailEnd type="triangle"/>
+          </a:ln>
+          <a:effectLst/>
+        </p:spPr>
+        <p:style>
+          <a:lnRef idx="1">
+            <a:schemeClr val="accent1"/>
+          </a:lnRef>
+          <a:fillRef idx="0">
+            <a:schemeClr val="accent1"/>
+          </a:fillRef>
+          <a:effectRef idx="0">
+            <a:schemeClr val="accent1"/>
+          </a:effectRef>
+          <a:fontRef idx="minor">
+            <a:schemeClr val="tx1"/>
+          </a:fontRef>
+        </p:style>
+      </p:cxnSp>
+      <p:cxnSp>
+        <p:nvCxnSpPr>
+          <p:cNvPr id="14" name="Gewinkelter Verbinder 13"/>
+          <p:cNvCxnSpPr>
+            <a:stCxn id="8" idx="3"/>
+            <a:endCxn id="13" idx="0"/>
+          </p:cNvCxnSpPr>
+          <p:nvPr/>
+        </p:nvCxnSpPr>
+        <p:spPr>
+          <a:xfrm>
+            <a:off x="5429095" y="1222222"/>
+            <a:ext cx="1381897" cy="391576"/>
+          </a:xfrm>
+          <a:prstGeom prst="bentConnector2">
+            <a:avLst/>
+          </a:prstGeom>
+          <a:ln w="28575">
+            <a:solidFill>
+              <a:schemeClr val="tx1"/>
+            </a:solidFill>
+            <a:tailEnd type="triangle"/>
+          </a:ln>
+          <a:effectLst/>
+        </p:spPr>
+        <p:style>
+          <a:lnRef idx="1">
+            <a:schemeClr val="accent1"/>
+          </a:lnRef>
+          <a:fillRef idx="0">
+            <a:schemeClr val="accent1"/>
+          </a:fillRef>
+          <a:effectRef idx="0">
+            <a:schemeClr val="accent1"/>
+          </a:effectRef>
+          <a:fontRef idx="minor">
+            <a:schemeClr val="tx1"/>
+          </a:fontRef>
+        </p:style>
+      </p:cxnSp>
+      <p:cxnSp>
+        <p:nvCxnSpPr>
+          <p:cNvPr id="15" name="Gerade Verbindung mit Pfeil 14"/>
+          <p:cNvCxnSpPr/>
+          <p:nvPr/>
+        </p:nvCxnSpPr>
+        <p:spPr>
+          <a:xfrm>
+            <a:off x="4437476" y="4418562"/>
+            <a:ext cx="0" cy="299422"/>
+          </a:xfrm>
+          <a:prstGeom prst="straightConnector1">
+            <a:avLst/>
+          </a:prstGeom>
+          <a:ln w="28575">
+            <a:solidFill>
+              <a:schemeClr val="tx1"/>
+            </a:solidFill>
+            <a:tailEnd type="triangle"/>
+          </a:ln>
+          <a:effectLst/>
+        </p:spPr>
+        <p:style>
+          <a:lnRef idx="1">
+            <a:schemeClr val="accent1"/>
+          </a:lnRef>
+          <a:fillRef idx="0">
+            <a:schemeClr val="accent1"/>
+          </a:fillRef>
+          <a:effectRef idx="0">
+            <a:schemeClr val="accent1"/>
+          </a:effectRef>
+          <a:fontRef idx="minor">
+            <a:schemeClr val="tx1"/>
+          </a:fontRef>
+        </p:style>
+      </p:cxnSp>
+      <p:cxnSp>
+        <p:nvCxnSpPr>
+          <p:cNvPr id="16" name="Gewinkelter Verbinder 15"/>
+          <p:cNvCxnSpPr/>
+          <p:nvPr/>
+        </p:nvCxnSpPr>
+        <p:spPr>
+          <a:xfrm rot="5400000">
+            <a:off x="5283212" y="2890783"/>
+            <a:ext cx="682042" cy="2373515"/>
+          </a:xfrm>
+          <a:prstGeom prst="bentConnector2">
+            <a:avLst/>
+          </a:prstGeom>
+          <a:ln w="28575">
+            <a:solidFill>
+              <a:schemeClr val="tx1"/>
+            </a:solidFill>
+            <a:tailEnd type="triangle"/>
+          </a:ln>
+          <a:effectLst/>
+        </p:spPr>
+        <p:style>
+          <a:lnRef idx="1">
+            <a:schemeClr val="accent1"/>
+          </a:lnRef>
+          <a:fillRef idx="0">
+            <a:schemeClr val="accent1"/>
+          </a:fillRef>
+          <a:effectRef idx="0">
+            <a:schemeClr val="accent1"/>
+          </a:effectRef>
+          <a:fontRef idx="minor">
+            <a:schemeClr val="tx1"/>
+          </a:fontRef>
+        </p:style>
+      </p:cxnSp>
+      <p:sp>
+        <p:nvSpPr>
+          <p:cNvPr id="18" name="Rechteck 17"/>
+          <p:cNvSpPr/>
+          <p:nvPr/>
+        </p:nvSpPr>
+        <p:spPr>
+          <a:xfrm>
+            <a:off x="5816883" y="851469"/>
+            <a:ext cx="606320" cy="369332"/>
+          </a:xfrm>
+          <a:prstGeom prst="rect">
+            <a:avLst/>
+          </a:prstGeom>
+        </p:spPr>
+        <p:txBody>
+          <a:bodyPr wrap="none">
+            <a:spAutoFit/>
+          </a:bodyPr>
+          <a:lstStyle/>
+          <a:p>
+            <a:r>
+              <a:rPr lang="de-DE" dirty="0" smtClean="0">
+                <a:latin typeface="Dubai" panose="020B0503030403030204" pitchFamily="34" charset="-78"/>
+                <a:cs typeface="Dubai" panose="020B0503030403030204" pitchFamily="34" charset="-78"/>
+              </a:rPr>
+              <a:t>True</a:t>
+            </a:r>
+            <a:endParaRPr lang="de-DE" dirty="0"/>
+          </a:p>
+        </p:txBody>
+      </p:sp>
+      <p:sp>
+        <p:nvSpPr>
+          <p:cNvPr id="19" name="Rechteck 18"/>
+          <p:cNvSpPr/>
+          <p:nvPr/>
+        </p:nvSpPr>
+        <p:spPr>
+          <a:xfrm flipH="1">
+            <a:off x="819162" y="1613797"/>
+            <a:ext cx="2489593" cy="533071"/>
+          </a:xfrm>
+          <a:prstGeom prst="rect">
+            <a:avLst/>
+          </a:prstGeom>
+          <a:solidFill>
+            <a:schemeClr val="bg1"/>
+          </a:solidFill>
+          <a:ln w="28575">
+            <a:solidFill>
+              <a:schemeClr val="tx1"/>
+            </a:solidFill>
+          </a:ln>
+          <a:effectLst/>
+        </p:spPr>
+        <p:style>
+          <a:lnRef idx="2">
+            <a:schemeClr val="accent1">
+              <a:shade val="50000"/>
+            </a:schemeClr>
+          </a:lnRef>
+          <a:fillRef idx="1">
+            <a:schemeClr val="accent1"/>
+          </a:fillRef>
+          <a:effectRef idx="0">
+            <a:schemeClr val="accent1"/>
+          </a:effectRef>
+          <a:fontRef idx="minor">
+            <a:schemeClr val="lt1"/>
+          </a:fontRef>
+        </p:style>
+        <p:txBody>
+          <a:bodyPr rtlCol="0" anchor="ctr"/>
+          <a:lstStyle/>
+          <a:p>
+            <a:pPr algn="ctr"/>
+            <a:r>
+              <a:rPr lang="de-DE" dirty="0" err="1" smtClean="0">
+                <a:solidFill>
+                  <a:schemeClr val="tx1"/>
+                </a:solidFill>
+                <a:latin typeface="Dubai" panose="020B0503030403030204" pitchFamily="34" charset="-78"/>
+                <a:cs typeface="Dubai" panose="020B0503030403030204" pitchFamily="34" charset="-78"/>
+              </a:rPr>
+              <a:t>print</a:t>
+            </a:r>
+            <a:r>
+              <a:rPr lang="de-DE" dirty="0" smtClean="0">
+                <a:solidFill>
+                  <a:schemeClr val="tx1"/>
+                </a:solidFill>
+                <a:latin typeface="Dubai" panose="020B0503030403030204" pitchFamily="34" charset="-78"/>
+                <a:cs typeface="Dubai" panose="020B0503030403030204" pitchFamily="34" charset="-78"/>
+              </a:rPr>
+              <a:t>('x ist </a:t>
+            </a:r>
+            <a:r>
+              <a:rPr lang="de-DE" dirty="0" smtClean="0">
+                <a:solidFill>
+                  <a:schemeClr val="tx1"/>
+                </a:solidFill>
+                <a:latin typeface="Dubai" panose="020B0503030403030204" pitchFamily="34" charset="-78"/>
+                <a:cs typeface="Dubai" panose="020B0503030403030204" pitchFamily="34" charset="-78"/>
+              </a:rPr>
+              <a:t>gleich')</a:t>
+            </a:r>
+            <a:endParaRPr lang="de-DE" dirty="0">
+              <a:solidFill>
+                <a:schemeClr val="tx1"/>
+              </a:solidFill>
+              <a:latin typeface="Dubai" panose="020B0503030403030204" pitchFamily="34" charset="-78"/>
+              <a:cs typeface="Dubai" panose="020B0503030403030204" pitchFamily="34" charset="-78"/>
+            </a:endParaRPr>
+          </a:p>
+        </p:txBody>
+      </p:sp>
+      <p:cxnSp>
+        <p:nvCxnSpPr>
+          <p:cNvPr id="20" name="Gewinkelter Verbinder 19"/>
+          <p:cNvCxnSpPr/>
+          <p:nvPr/>
+        </p:nvCxnSpPr>
+        <p:spPr>
+          <a:xfrm flipH="1">
+            <a:off x="2063959" y="1222222"/>
+            <a:ext cx="1381896" cy="391576"/>
+          </a:xfrm>
+          <a:prstGeom prst="bentConnector2">
+            <a:avLst/>
+          </a:prstGeom>
+          <a:ln w="28575">
+            <a:solidFill>
+              <a:schemeClr val="tx1"/>
+            </a:solidFill>
+            <a:tailEnd type="triangle"/>
+          </a:ln>
+          <a:effectLst/>
+        </p:spPr>
+        <p:style>
+          <a:lnRef idx="1">
+            <a:schemeClr val="accent1"/>
+          </a:lnRef>
+          <a:fillRef idx="0">
+            <a:schemeClr val="accent1"/>
+          </a:fillRef>
+          <a:effectRef idx="0">
+            <a:schemeClr val="accent1"/>
+          </a:effectRef>
+          <a:fontRef idx="minor">
+            <a:schemeClr val="tx1"/>
+          </a:fontRef>
+        </p:style>
+      </p:cxnSp>
+      <p:cxnSp>
+        <p:nvCxnSpPr>
+          <p:cNvPr id="21" name="Gewinkelter Verbinder 20"/>
+          <p:cNvCxnSpPr>
+            <a:stCxn id="19" idx="2"/>
+          </p:cNvCxnSpPr>
+          <p:nvPr/>
+        </p:nvCxnSpPr>
+        <p:spPr>
+          <a:xfrm rot="16200000" flipH="1">
+            <a:off x="2133862" y="2076964"/>
+            <a:ext cx="2260989" cy="2400796"/>
+          </a:xfrm>
+          <a:prstGeom prst="bentConnector2">
+            <a:avLst/>
+          </a:prstGeom>
+          <a:ln w="28575">
+            <a:solidFill>
+              <a:schemeClr val="tx1"/>
+            </a:solidFill>
+            <a:tailEnd type="triangle"/>
+          </a:ln>
+          <a:effectLst/>
+        </p:spPr>
+        <p:style>
+          <a:lnRef idx="1">
+            <a:schemeClr val="accent1"/>
+          </a:lnRef>
+          <a:fillRef idx="0">
+            <a:schemeClr val="accent1"/>
+          </a:fillRef>
+          <a:effectRef idx="0">
+            <a:schemeClr val="accent1"/>
+          </a:effectRef>
+          <a:fontRef idx="minor">
+            <a:schemeClr val="tx1"/>
+          </a:fontRef>
+        </p:style>
+      </p:cxnSp>
+      <p:sp>
+        <p:nvSpPr>
+          <p:cNvPr id="22" name="Rechteck 21"/>
+          <p:cNvSpPr/>
+          <p:nvPr/>
+        </p:nvSpPr>
+        <p:spPr>
+          <a:xfrm flipH="1">
+            <a:off x="2451747" y="851469"/>
+            <a:ext cx="658385" cy="369332"/>
+          </a:xfrm>
+          <a:prstGeom prst="rect">
+            <a:avLst/>
+          </a:prstGeom>
+        </p:spPr>
+        <p:txBody>
+          <a:bodyPr wrap="none">
+            <a:spAutoFit/>
+          </a:bodyPr>
+          <a:lstStyle/>
+          <a:p>
+            <a:r>
+              <a:rPr lang="de-DE" dirty="0" err="1" smtClean="0">
+                <a:latin typeface="Dubai" panose="020B0503030403030204" pitchFamily="34" charset="-78"/>
+                <a:cs typeface="Dubai" panose="020B0503030403030204" pitchFamily="34" charset="-78"/>
+              </a:rPr>
+              <a:t>False</a:t>
+            </a:r>
+            <a:endParaRPr lang="de-DE" dirty="0"/>
+          </a:p>
+        </p:txBody>
+      </p:sp>
+      <p:sp>
+        <p:nvSpPr>
+          <p:cNvPr id="30" name="Flussdiagramm: Verzweigung 29"/>
+          <p:cNvSpPr/>
+          <p:nvPr/>
+        </p:nvSpPr>
+        <p:spPr>
+          <a:xfrm>
+            <a:off x="5819372" y="1613796"/>
+            <a:ext cx="1983240" cy="1014157"/>
+          </a:xfrm>
+          <a:prstGeom prst="flowChartDecision">
+            <a:avLst/>
+          </a:prstGeom>
+          <a:solidFill>
+            <a:schemeClr val="bg1"/>
+          </a:solidFill>
+          <a:ln w="28575">
+            <a:solidFill>
+              <a:schemeClr val="tx1"/>
+            </a:solidFill>
+          </a:ln>
+          <a:effectLst/>
+        </p:spPr>
+        <p:style>
+          <a:lnRef idx="2">
+            <a:schemeClr val="accent1">
+              <a:shade val="50000"/>
+            </a:schemeClr>
+          </a:lnRef>
+          <a:fillRef idx="1">
+            <a:schemeClr val="accent1"/>
+          </a:fillRef>
+          <a:effectRef idx="0">
+            <a:schemeClr val="accent1"/>
+          </a:effectRef>
+          <a:fontRef idx="minor">
+            <a:schemeClr val="lt1"/>
+          </a:fontRef>
+        </p:style>
+        <p:txBody>
+          <a:bodyPr lIns="0" rIns="0" rtlCol="0" anchor="ctr"/>
+          <a:lstStyle/>
+          <a:p>
+            <a:pPr algn="ctr"/>
+            <a:r>
+              <a:rPr lang="de-DE" dirty="0" smtClean="0">
+                <a:solidFill>
+                  <a:schemeClr val="tx1"/>
+                </a:solidFill>
+                <a:latin typeface="Dubai" panose="020B0503030403030204" pitchFamily="34" charset="-78"/>
+                <a:cs typeface="Dubai" panose="020B0503030403030204" pitchFamily="34" charset="-78"/>
+              </a:rPr>
+              <a:t>x &lt; </a:t>
+            </a:r>
+            <a:r>
+              <a:rPr lang="de-DE" dirty="0">
+                <a:solidFill>
+                  <a:schemeClr val="tx1"/>
+                </a:solidFill>
+                <a:latin typeface="Dubai" panose="020B0503030403030204" pitchFamily="34" charset="-78"/>
+                <a:cs typeface="Dubai" panose="020B0503030403030204" pitchFamily="34" charset="-78"/>
+              </a:rPr>
+              <a:t>y</a:t>
+            </a:r>
+            <a:endParaRPr lang="de-DE" dirty="0">
+              <a:solidFill>
+                <a:schemeClr val="tx1"/>
+              </a:solidFill>
+              <a:latin typeface="Dubai" panose="020B0503030403030204" pitchFamily="34" charset="-78"/>
+              <a:cs typeface="Dubai" panose="020B0503030403030204" pitchFamily="34" charset="-78"/>
+            </a:endParaRPr>
+          </a:p>
+        </p:txBody>
+      </p:sp>
+      <p:sp>
+        <p:nvSpPr>
+          <p:cNvPr id="34" name="Rechteck 33"/>
+          <p:cNvSpPr/>
+          <p:nvPr/>
+        </p:nvSpPr>
+        <p:spPr>
+          <a:xfrm>
+            <a:off x="7939712" y="2512451"/>
+            <a:ext cx="2489593" cy="533071"/>
+          </a:xfrm>
+          <a:prstGeom prst="rect">
+            <a:avLst/>
+          </a:prstGeom>
+          <a:solidFill>
+            <a:schemeClr val="bg1"/>
+          </a:solidFill>
+          <a:ln w="28575">
+            <a:solidFill>
+              <a:schemeClr val="tx1"/>
+            </a:solidFill>
+          </a:ln>
+          <a:effectLst/>
+        </p:spPr>
+        <p:style>
+          <a:lnRef idx="2">
+            <a:schemeClr val="accent1">
+              <a:shade val="50000"/>
+            </a:schemeClr>
+          </a:lnRef>
+          <a:fillRef idx="1">
+            <a:schemeClr val="accent1"/>
+          </a:fillRef>
+          <a:effectRef idx="0">
+            <a:schemeClr val="accent1"/>
+          </a:effectRef>
+          <a:fontRef idx="minor">
+            <a:schemeClr val="lt1"/>
+          </a:fontRef>
+        </p:style>
+        <p:txBody>
+          <a:bodyPr rtlCol="0" anchor="ctr"/>
+          <a:lstStyle/>
+          <a:p>
+            <a:pPr algn="ctr"/>
+            <a:r>
+              <a:rPr lang="de-DE" dirty="0" err="1" smtClean="0">
+                <a:solidFill>
+                  <a:schemeClr val="tx1"/>
+                </a:solidFill>
+                <a:latin typeface="Dubai" panose="020B0503030403030204" pitchFamily="34" charset="-78"/>
+                <a:cs typeface="Dubai" panose="020B0503030403030204" pitchFamily="34" charset="-78"/>
+              </a:rPr>
+              <a:t>print</a:t>
+            </a:r>
+            <a:r>
+              <a:rPr lang="de-DE" dirty="0" smtClean="0">
+                <a:solidFill>
+                  <a:schemeClr val="tx1"/>
+                </a:solidFill>
+                <a:latin typeface="Dubai" panose="020B0503030403030204" pitchFamily="34" charset="-78"/>
+                <a:cs typeface="Dubai" panose="020B0503030403030204" pitchFamily="34" charset="-78"/>
+              </a:rPr>
+              <a:t>('x ist </a:t>
+            </a:r>
+            <a:r>
+              <a:rPr lang="de-DE" dirty="0" smtClean="0">
+                <a:solidFill>
+                  <a:schemeClr val="tx1"/>
+                </a:solidFill>
+                <a:latin typeface="Dubai" panose="020B0503030403030204" pitchFamily="34" charset="-78"/>
+                <a:cs typeface="Dubai" panose="020B0503030403030204" pitchFamily="34" charset="-78"/>
+              </a:rPr>
+              <a:t>größer')</a:t>
+            </a:r>
+            <a:endParaRPr lang="de-DE" dirty="0">
+              <a:solidFill>
+                <a:schemeClr val="tx1"/>
+              </a:solidFill>
+              <a:latin typeface="Dubai" panose="020B0503030403030204" pitchFamily="34" charset="-78"/>
+              <a:cs typeface="Dubai" panose="020B0503030403030204" pitchFamily="34" charset="-78"/>
+            </a:endParaRPr>
+          </a:p>
+        </p:txBody>
+      </p:sp>
+      <p:cxnSp>
+        <p:nvCxnSpPr>
+          <p:cNvPr id="35" name="Gewinkelter Verbinder 34"/>
+          <p:cNvCxnSpPr>
+            <a:stCxn id="30" idx="3"/>
+            <a:endCxn id="34" idx="0"/>
+          </p:cNvCxnSpPr>
+          <p:nvPr/>
+        </p:nvCxnSpPr>
+        <p:spPr>
+          <a:xfrm>
+            <a:off x="7802612" y="2120875"/>
+            <a:ext cx="1381897" cy="391576"/>
+          </a:xfrm>
+          <a:prstGeom prst="bentConnector2">
+            <a:avLst/>
+          </a:prstGeom>
+          <a:ln w="28575">
+            <a:solidFill>
+              <a:schemeClr val="tx1"/>
+            </a:solidFill>
+            <a:tailEnd type="triangle"/>
+          </a:ln>
+          <a:effectLst/>
+        </p:spPr>
+        <p:style>
+          <a:lnRef idx="1">
+            <a:schemeClr val="accent1"/>
+          </a:lnRef>
+          <a:fillRef idx="0">
+            <a:schemeClr val="accent1"/>
+          </a:fillRef>
+          <a:effectRef idx="0">
+            <a:schemeClr val="accent1"/>
+          </a:effectRef>
+          <a:fontRef idx="minor">
+            <a:schemeClr val="tx1"/>
+          </a:fontRef>
+        </p:style>
+      </p:cxnSp>
+      <p:cxnSp>
+        <p:nvCxnSpPr>
+          <p:cNvPr id="37" name="Gewinkelter Verbinder 36"/>
+          <p:cNvCxnSpPr>
+            <a:stCxn id="34" idx="2"/>
+          </p:cNvCxnSpPr>
+          <p:nvPr/>
+        </p:nvCxnSpPr>
+        <p:spPr>
+          <a:xfrm rot="5400000">
+            <a:off x="7656731" y="2199786"/>
+            <a:ext cx="682042" cy="2373515"/>
+          </a:xfrm>
+          <a:prstGeom prst="bentConnector2">
+            <a:avLst/>
+          </a:prstGeom>
+          <a:ln w="28575">
+            <a:solidFill>
+              <a:schemeClr val="tx1"/>
+            </a:solidFill>
+            <a:tailEnd type="triangle"/>
+          </a:ln>
+          <a:effectLst/>
+        </p:spPr>
+        <p:style>
+          <a:lnRef idx="1">
+            <a:schemeClr val="accent1"/>
+          </a:lnRef>
+          <a:fillRef idx="0">
+            <a:schemeClr val="accent1"/>
+          </a:fillRef>
+          <a:effectRef idx="0">
+            <a:schemeClr val="accent1"/>
+          </a:effectRef>
+          <a:fontRef idx="minor">
+            <a:schemeClr val="tx1"/>
+          </a:fontRef>
+        </p:style>
+      </p:cxnSp>
+      <p:sp>
+        <p:nvSpPr>
+          <p:cNvPr id="38" name="Rechteck 37"/>
+          <p:cNvSpPr/>
+          <p:nvPr/>
+        </p:nvSpPr>
+        <p:spPr>
+          <a:xfrm>
+            <a:off x="8190400" y="1750122"/>
+            <a:ext cx="606320" cy="369332"/>
+          </a:xfrm>
+          <a:prstGeom prst="rect">
+            <a:avLst/>
+          </a:prstGeom>
+        </p:spPr>
+        <p:txBody>
+          <a:bodyPr wrap="none">
+            <a:spAutoFit/>
+          </a:bodyPr>
+          <a:lstStyle/>
+          <a:p>
+            <a:r>
+              <a:rPr lang="de-DE" dirty="0" smtClean="0">
+                <a:latin typeface="Dubai" panose="020B0503030403030204" pitchFamily="34" charset="-78"/>
+                <a:cs typeface="Dubai" panose="020B0503030403030204" pitchFamily="34" charset="-78"/>
+              </a:rPr>
+              <a:t>True</a:t>
+            </a:r>
+            <a:endParaRPr lang="de-DE" dirty="0"/>
+          </a:p>
+        </p:txBody>
+      </p:sp>
+      <p:sp>
+        <p:nvSpPr>
+          <p:cNvPr id="39" name="Rechteck 38"/>
+          <p:cNvSpPr/>
+          <p:nvPr/>
+        </p:nvSpPr>
+        <p:spPr>
+          <a:xfrm flipH="1">
+            <a:off x="3192679" y="2512450"/>
+            <a:ext cx="2489593" cy="533071"/>
+          </a:xfrm>
+          <a:prstGeom prst="rect">
+            <a:avLst/>
+          </a:prstGeom>
+          <a:solidFill>
+            <a:schemeClr val="bg1"/>
+          </a:solidFill>
+          <a:ln w="28575">
+            <a:solidFill>
+              <a:schemeClr val="tx1"/>
+            </a:solidFill>
+          </a:ln>
+          <a:effectLst/>
+        </p:spPr>
+        <p:style>
+          <a:lnRef idx="2">
+            <a:schemeClr val="accent1">
+              <a:shade val="50000"/>
+            </a:schemeClr>
+          </a:lnRef>
+          <a:fillRef idx="1">
+            <a:schemeClr val="accent1"/>
+          </a:fillRef>
+          <a:effectRef idx="0">
+            <a:schemeClr val="accent1"/>
+          </a:effectRef>
+          <a:fontRef idx="minor">
+            <a:schemeClr val="lt1"/>
+          </a:fontRef>
+        </p:style>
+        <p:txBody>
+          <a:bodyPr rtlCol="0" anchor="ctr"/>
+          <a:lstStyle/>
+          <a:p>
+            <a:pPr algn="ctr"/>
+            <a:r>
+              <a:rPr lang="de-DE" dirty="0" err="1" smtClean="0">
+                <a:solidFill>
+                  <a:schemeClr val="tx1"/>
+                </a:solidFill>
+                <a:latin typeface="Dubai" panose="020B0503030403030204" pitchFamily="34" charset="-78"/>
+                <a:cs typeface="Dubai" panose="020B0503030403030204" pitchFamily="34" charset="-78"/>
+              </a:rPr>
+              <a:t>print</a:t>
+            </a:r>
+            <a:r>
+              <a:rPr lang="de-DE" dirty="0" smtClean="0">
+                <a:solidFill>
+                  <a:schemeClr val="tx1"/>
+                </a:solidFill>
+                <a:latin typeface="Dubai" panose="020B0503030403030204" pitchFamily="34" charset="-78"/>
+                <a:cs typeface="Dubai" panose="020B0503030403030204" pitchFamily="34" charset="-78"/>
+              </a:rPr>
+              <a:t>('x ist </a:t>
+            </a:r>
+            <a:r>
+              <a:rPr lang="de-DE" dirty="0" smtClean="0">
+                <a:solidFill>
+                  <a:schemeClr val="tx1"/>
+                </a:solidFill>
+                <a:latin typeface="Dubai" panose="020B0503030403030204" pitchFamily="34" charset="-78"/>
+                <a:cs typeface="Dubai" panose="020B0503030403030204" pitchFamily="34" charset="-78"/>
+              </a:rPr>
+              <a:t>kleiner')</a:t>
+            </a:r>
+            <a:endParaRPr lang="de-DE" dirty="0">
+              <a:solidFill>
+                <a:schemeClr val="tx1"/>
+              </a:solidFill>
+              <a:latin typeface="Dubai" panose="020B0503030403030204" pitchFamily="34" charset="-78"/>
+              <a:cs typeface="Dubai" panose="020B0503030403030204" pitchFamily="34" charset="-78"/>
+            </a:endParaRPr>
+          </a:p>
+        </p:txBody>
+      </p:sp>
+      <p:cxnSp>
+        <p:nvCxnSpPr>
+          <p:cNvPr id="40" name="Gewinkelter Verbinder 39"/>
+          <p:cNvCxnSpPr/>
+          <p:nvPr/>
+        </p:nvCxnSpPr>
+        <p:spPr>
+          <a:xfrm flipH="1">
+            <a:off x="4437476" y="2120875"/>
+            <a:ext cx="1381896" cy="391576"/>
+          </a:xfrm>
+          <a:prstGeom prst="bentConnector2">
+            <a:avLst/>
+          </a:prstGeom>
+          <a:ln w="28575">
+            <a:solidFill>
+              <a:schemeClr val="tx1"/>
+            </a:solidFill>
+            <a:tailEnd type="triangle"/>
+          </a:ln>
+          <a:effectLst/>
+        </p:spPr>
+        <p:style>
+          <a:lnRef idx="1">
+            <a:schemeClr val="accent1"/>
+          </a:lnRef>
+          <a:fillRef idx="0">
+            <a:schemeClr val="accent1"/>
+          </a:fillRef>
+          <a:effectRef idx="0">
+            <a:schemeClr val="accent1"/>
+          </a:effectRef>
+          <a:fontRef idx="minor">
+            <a:schemeClr val="tx1"/>
+          </a:fontRef>
+        </p:style>
+      </p:cxnSp>
+      <p:cxnSp>
+        <p:nvCxnSpPr>
+          <p:cNvPr id="41" name="Gewinkelter Verbinder 40"/>
+          <p:cNvCxnSpPr/>
+          <p:nvPr/>
+        </p:nvCxnSpPr>
+        <p:spPr>
+          <a:xfrm rot="16200000" flipH="1">
+            <a:off x="5283215" y="2198036"/>
+            <a:ext cx="682043" cy="2373513"/>
+          </a:xfrm>
+          <a:prstGeom prst="bentConnector2">
+            <a:avLst/>
+          </a:prstGeom>
+          <a:ln w="28575">
+            <a:solidFill>
+              <a:schemeClr val="tx1"/>
+            </a:solidFill>
+            <a:tailEnd type="triangle"/>
+          </a:ln>
+          <a:effectLst/>
+        </p:spPr>
+        <p:style>
+          <a:lnRef idx="1">
+            <a:schemeClr val="accent1"/>
+          </a:lnRef>
+          <a:fillRef idx="0">
+            <a:schemeClr val="accent1"/>
+          </a:fillRef>
+          <a:effectRef idx="0">
+            <a:schemeClr val="accent1"/>
+          </a:effectRef>
+          <a:fontRef idx="minor">
+            <a:schemeClr val="tx1"/>
+          </a:fontRef>
+        </p:style>
+      </p:cxnSp>
+      <p:sp>
+        <p:nvSpPr>
+          <p:cNvPr id="42" name="Rechteck 41"/>
+          <p:cNvSpPr/>
+          <p:nvPr/>
+        </p:nvSpPr>
+        <p:spPr>
+          <a:xfrm flipH="1">
+            <a:off x="4825264" y="1750122"/>
+            <a:ext cx="658385" cy="369332"/>
+          </a:xfrm>
+          <a:prstGeom prst="rect">
+            <a:avLst/>
+          </a:prstGeom>
+        </p:spPr>
+        <p:txBody>
+          <a:bodyPr wrap="none">
+            <a:spAutoFit/>
+          </a:bodyPr>
+          <a:lstStyle/>
+          <a:p>
+            <a:r>
+              <a:rPr lang="de-DE" dirty="0" err="1" smtClean="0">
+                <a:latin typeface="Dubai" panose="020B0503030403030204" pitchFamily="34" charset="-78"/>
+                <a:cs typeface="Dubai" panose="020B0503030403030204" pitchFamily="34" charset="-78"/>
+              </a:rPr>
+              <a:t>False</a:t>
+            </a:r>
+            <a:endParaRPr lang="de-DE" dirty="0"/>
+          </a:p>
+        </p:txBody>
+      </p:sp>
+    </p:spTree>
+    <p:extLst>
+      <p:ext uri="{BB962C8B-B14F-4D97-AF65-F5344CB8AC3E}">
+        <p14:creationId xmlns:p14="http://schemas.microsoft.com/office/powerpoint/2010/main" val="1014460433"/>
       </p:ext>
     </p:extLst>
   </p:cSld>

</xml_diff>